<commit_message>
Update QA cluster diagram
</commit_message>
<xml_diff>
--- a/diagrams/architecture/debugger_architecture_qa_cluster.pptx
+++ b/diagrams/architecture/debugger_architecture_qa_cluster.pptx
@@ -6,7 +6,6 @@
   </p:sldMasterIdLst>
   <p:sldIdLst>
     <p:sldId id="256" r:id="rId2"/>
-    <p:sldId id="257" r:id="rId3"/>
   </p:sldIdLst>
   <p:sldSz cx="12192000" cy="6858000"/>
   <p:notesSz cx="6858000" cy="9144000"/>
@@ -107,7 +106,7 @@
   </p:defaultTextStyle>
   <p:extLst>
     <p:ext uri="{EFAFB233-063F-42B5-8137-9DF3F51BA10A}">
-      <p15:sldGuideLst xmlns:p15="http://schemas.microsoft.com/office/powerpoint/2012/main"/>
+      <p15:sldGuideLst xmlns:p15="http://schemas.microsoft.com/office/powerpoint/2012/main" xmlns=""/>
     </p:ext>
   </p:extLst>
 </p:presentation>
@@ -244,7 +243,7 @@
           <a:p>
             <a:fld id="{142E0E9B-B8B1-4041-B901-833A32B371BD}" type="datetimeFigureOut">
               <a:rPr lang="en-US" smtClean="0"/>
-              <a:t>1/21/2014</a:t>
+              <a:t>2/14/14</a:t>
             </a:fld>
             <a:endParaRPr lang="en-US"/>
           </a:p>
@@ -414,7 +413,7 @@
           <a:p>
             <a:fld id="{142E0E9B-B8B1-4041-B901-833A32B371BD}" type="datetimeFigureOut">
               <a:rPr lang="en-US" smtClean="0"/>
-              <a:t>1/21/2014</a:t>
+              <a:t>2/14/14</a:t>
             </a:fld>
             <a:endParaRPr lang="en-US"/>
           </a:p>
@@ -594,7 +593,7 @@
           <a:p>
             <a:fld id="{142E0E9B-B8B1-4041-B901-833A32B371BD}" type="datetimeFigureOut">
               <a:rPr lang="en-US" smtClean="0"/>
-              <a:t>1/21/2014</a:t>
+              <a:t>2/14/14</a:t>
             </a:fld>
             <a:endParaRPr lang="en-US"/>
           </a:p>
@@ -764,7 +763,7 @@
           <a:p>
             <a:fld id="{142E0E9B-B8B1-4041-B901-833A32B371BD}" type="datetimeFigureOut">
               <a:rPr lang="en-US" smtClean="0"/>
-              <a:t>1/21/2014</a:t>
+              <a:t>2/14/14</a:t>
             </a:fld>
             <a:endParaRPr lang="en-US"/>
           </a:p>
@@ -1010,7 +1009,7 @@
           <a:p>
             <a:fld id="{142E0E9B-B8B1-4041-B901-833A32B371BD}" type="datetimeFigureOut">
               <a:rPr lang="en-US" smtClean="0"/>
-              <a:t>1/21/2014</a:t>
+              <a:t>2/14/14</a:t>
             </a:fld>
             <a:endParaRPr lang="en-US"/>
           </a:p>
@@ -1242,7 +1241,7 @@
           <a:p>
             <a:fld id="{142E0E9B-B8B1-4041-B901-833A32B371BD}" type="datetimeFigureOut">
               <a:rPr lang="en-US" smtClean="0"/>
-              <a:t>1/21/2014</a:t>
+              <a:t>2/14/14</a:t>
             </a:fld>
             <a:endParaRPr lang="en-US"/>
           </a:p>
@@ -1609,7 +1608,7 @@
           <a:p>
             <a:fld id="{142E0E9B-B8B1-4041-B901-833A32B371BD}" type="datetimeFigureOut">
               <a:rPr lang="en-US" smtClean="0"/>
-              <a:t>1/21/2014</a:t>
+              <a:t>2/14/14</a:t>
             </a:fld>
             <a:endParaRPr lang="en-US"/>
           </a:p>
@@ -1727,7 +1726,7 @@
           <a:p>
             <a:fld id="{142E0E9B-B8B1-4041-B901-833A32B371BD}" type="datetimeFigureOut">
               <a:rPr lang="en-US" smtClean="0"/>
-              <a:t>1/21/2014</a:t>
+              <a:t>2/14/14</a:t>
             </a:fld>
             <a:endParaRPr lang="en-US"/>
           </a:p>
@@ -1822,7 +1821,7 @@
           <a:p>
             <a:fld id="{142E0E9B-B8B1-4041-B901-833A32B371BD}" type="datetimeFigureOut">
               <a:rPr lang="en-US" smtClean="0"/>
-              <a:t>1/21/2014</a:t>
+              <a:t>2/14/14</a:t>
             </a:fld>
             <a:endParaRPr lang="en-US"/>
           </a:p>
@@ -2099,7 +2098,7 @@
           <a:p>
             <a:fld id="{142E0E9B-B8B1-4041-B901-833A32B371BD}" type="datetimeFigureOut">
               <a:rPr lang="en-US" smtClean="0"/>
-              <a:t>1/21/2014</a:t>
+              <a:t>2/14/14</a:t>
             </a:fld>
             <a:endParaRPr lang="en-US"/>
           </a:p>
@@ -2352,7 +2351,7 @@
           <a:p>
             <a:fld id="{142E0E9B-B8B1-4041-B901-833A32B371BD}" type="datetimeFigureOut">
               <a:rPr lang="en-US" smtClean="0"/>
-              <a:t>1/21/2014</a:t>
+              <a:t>2/14/14</a:t>
             </a:fld>
             <a:endParaRPr lang="en-US"/>
           </a:p>
@@ -2565,7 +2564,7 @@
           <a:p>
             <a:fld id="{142E0E9B-B8B1-4041-B901-833A32B371BD}" type="datetimeFigureOut">
               <a:rPr lang="en-US" smtClean="0"/>
-              <a:t>1/21/2014</a:t>
+              <a:t>2/14/14</a:t>
             </a:fld>
             <a:endParaRPr lang="en-US"/>
           </a:p>
@@ -2979,9 +2978,9 @@
         <p:grpSpPr>
           <a:xfrm>
             <a:off x="1208667" y="2064066"/>
-            <a:ext cx="6754233" cy="3430100"/>
+            <a:ext cx="5336724" cy="3430100"/>
             <a:chOff x="1208667" y="1201923"/>
-            <a:chExt cx="9595092" cy="4872814"/>
+            <a:chExt cx="7581373" cy="4872814"/>
           </a:xfrm>
         </p:grpSpPr>
         <p:sp>
@@ -4184,107 +4183,11 @@
           <p:grpSpPr>
             <a:xfrm>
               <a:off x="5770029" y="2808887"/>
-              <a:ext cx="5033730" cy="2605231"/>
+              <a:ext cx="3020011" cy="2603995"/>
               <a:chOff x="5770029" y="2369975"/>
-              <a:chExt cx="5033730" cy="2605231"/>
+              <a:chExt cx="3020011" cy="2603995"/>
             </a:xfrm>
           </p:grpSpPr>
-          <p:sp>
-            <p:nvSpPr>
-              <p:cNvPr id="53" name="Rectangle 52"/>
-              <p:cNvSpPr/>
-              <p:nvPr/>
-            </p:nvSpPr>
-            <p:spPr>
-              <a:xfrm>
-                <a:off x="5770029" y="2377054"/>
-                <a:ext cx="5033730" cy="2596916"/>
-              </a:xfrm>
-              <a:prstGeom prst="rect">
-                <a:avLst/>
-              </a:prstGeom>
-              <a:solidFill>
-                <a:schemeClr val="bg1"/>
-              </a:solidFill>
-              <a:ln w="38100">
-                <a:solidFill>
-                  <a:schemeClr val="tx1"/>
-                </a:solidFill>
-              </a:ln>
-            </p:spPr>
-            <p:style>
-              <a:lnRef idx="2">
-                <a:schemeClr val="accent1">
-                  <a:shade val="50000"/>
-                </a:schemeClr>
-              </a:lnRef>
-              <a:fillRef idx="1">
-                <a:schemeClr val="accent1"/>
-              </a:fillRef>
-              <a:effectRef idx="0">
-                <a:schemeClr val="accent1"/>
-              </a:effectRef>
-              <a:fontRef idx="minor">
-                <a:schemeClr val="lt1"/>
-              </a:fontRef>
-            </p:style>
-            <p:txBody>
-              <a:bodyPr rtlCol="0" anchor="ctr"/>
-              <a:lstStyle/>
-              <a:p>
-                <a:pPr algn="ctr"/>
-                <a:endParaRPr lang="en-US" sz="1200"/>
-              </a:p>
-            </p:txBody>
-          </p:sp>
-          <p:sp>
-            <p:nvSpPr>
-              <p:cNvPr id="54" name="Rectangle 53"/>
-              <p:cNvSpPr/>
-              <p:nvPr/>
-            </p:nvSpPr>
-            <p:spPr>
-              <a:xfrm>
-                <a:off x="8790037" y="2371210"/>
-                <a:ext cx="2013720" cy="2603996"/>
-              </a:xfrm>
-              <a:prstGeom prst="rect">
-                <a:avLst/>
-              </a:prstGeom>
-              <a:solidFill>
-                <a:schemeClr val="bg1"/>
-              </a:solidFill>
-              <a:ln w="38100">
-                <a:solidFill>
-                  <a:schemeClr val="tx1"/>
-                </a:solidFill>
-              </a:ln>
-            </p:spPr>
-            <p:style>
-              <a:lnRef idx="2">
-                <a:schemeClr val="accent1">
-                  <a:shade val="50000"/>
-                </a:schemeClr>
-              </a:lnRef>
-              <a:fillRef idx="1">
-                <a:schemeClr val="accent1"/>
-              </a:fillRef>
-              <a:effectRef idx="0">
-                <a:schemeClr val="accent1"/>
-              </a:effectRef>
-              <a:fontRef idx="minor">
-                <a:schemeClr val="lt1"/>
-              </a:fontRef>
-            </p:style>
-            <p:txBody>
-              <a:bodyPr rtlCol="0" anchor="ctr"/>
-              <a:lstStyle/>
-              <a:p>
-                <a:pPr algn="ctr"/>
-                <a:endParaRPr lang="en-US" sz="1200" dirty="0"/>
-              </a:p>
-            </p:txBody>
-          </p:sp>
           <p:sp>
             <p:nvSpPr>
               <p:cNvPr id="55" name="Rectangle 54"/>
@@ -4353,8 +4256,8 @@
             </p:nvSpPr>
             <p:spPr>
               <a:xfrm>
-                <a:off x="5770030" y="3314815"/>
-                <a:ext cx="3020010" cy="831183"/>
+                <a:off x="5770030" y="3243672"/>
+                <a:ext cx="3020010" cy="902328"/>
               </a:xfrm>
               <a:prstGeom prst="rect">
                 <a:avLst/>
@@ -4395,8 +4298,13 @@
                       <a:schemeClr val="tx1"/>
                     </a:solidFill>
                   </a:rPr>
-                  <a:t>Bug Checker</a:t>
+                  <a:t>Invariant Checker</a:t>
                 </a:r>
+                <a:endParaRPr lang="en-US" b="1" dirty="0" smtClean="0">
+                  <a:solidFill>
+                    <a:schemeClr val="tx1"/>
+                  </a:solidFill>
+                </a:endParaRPr>
               </a:p>
             </p:txBody>
           </p:sp>
@@ -4455,36 +4363,6 @@
               </a:p>
             </p:txBody>
           </p:sp>
-          <p:sp>
-            <p:nvSpPr>
-              <p:cNvPr id="58" name="TextBox 57"/>
-              <p:cNvSpPr txBox="1"/>
-              <p:nvPr/>
-            </p:nvSpPr>
-            <p:spPr>
-              <a:xfrm rot="3606069">
-                <a:off x="8577258" y="3344049"/>
-                <a:ext cx="2439281" cy="655843"/>
-              </a:xfrm>
-              <a:prstGeom prst="rect">
-                <a:avLst/>
-              </a:prstGeom>
-              <a:noFill/>
-            </p:spPr>
-            <p:txBody>
-              <a:bodyPr wrap="none" rtlCol="0">
-                <a:spAutoFit/>
-              </a:bodyPr>
-              <a:lstStyle/>
-              <a:p>
-                <a:r>
-                  <a:rPr lang="en-US" sz="2400" b="1" dirty="0" smtClean="0"/>
-                  <a:t>Coordinator</a:t>
-                </a:r>
-                <a:endParaRPr lang="en-US" sz="2400" b="1" dirty="0"/>
-              </a:p>
-            </p:txBody>
-          </p:sp>
         </p:grpSp>
         <p:sp>
           <p:nvSpPr>
@@ -4494,8 +4372,8 @@
           </p:nvSpPr>
           <p:spPr>
             <a:xfrm>
-              <a:off x="6184235" y="1955286"/>
-              <a:ext cx="4420474" cy="830734"/>
+              <a:off x="5916006" y="1619733"/>
+              <a:ext cx="2689298" cy="1180518"/>
             </a:xfrm>
             <a:prstGeom prst="rect">
               <a:avLst/>
@@ -4508,11 +4386,23 @@
             </a:bodyPr>
             <a:lstStyle/>
             <a:p>
+              <a:pPr algn="ctr"/>
               <a:r>
-                <a:rPr lang="en-US" sz="3200" b="1" dirty="0" smtClean="0"/>
-                <a:t>Test Orchestrator</a:t>
+                <a:rPr lang="en-US" sz="2400" b="1" dirty="0" smtClean="0"/>
+                <a:t>QA Test</a:t>
               </a:r>
-              <a:endParaRPr lang="en-US" sz="3200" b="1" dirty="0"/>
+            </a:p>
+            <a:p>
+              <a:pPr algn="ctr"/>
+              <a:r>
+                <a:rPr lang="en-US" sz="2400" b="1" dirty="0" smtClean="0"/>
+                <a:t> </a:t>
+              </a:r>
+              <a:r>
+                <a:rPr lang="en-US" sz="2400" b="1" dirty="0" smtClean="0"/>
+                <a:t>Orchestrator</a:t>
+              </a:r>
+              <a:endParaRPr lang="en-US" sz="2400" b="1" dirty="0"/>
             </a:p>
           </p:txBody>
         </p:sp>
@@ -4530,2025 +4420,7 @@
   <p:timing>
     <p:tnLst>
       <p:par>
-        <p:cTn id="1" dur="indefinite" restart="never" nodeType="tmRoot"/>
-      </p:par>
-    </p:tnLst>
-  </p:timing>
-</p:sld>
-</file>
-
-<file path=ppt/slides/slide2.xml><?xml version="1.0" encoding="utf-8"?>
-<p:sld xmlns:a="http://schemas.openxmlformats.org/drawingml/2006/main" xmlns:r="http://schemas.openxmlformats.org/officeDocument/2006/relationships" xmlns:p="http://schemas.openxmlformats.org/presentationml/2006/main">
-  <p:cSld>
-    <p:spTree>
-      <p:nvGrpSpPr>
-        <p:cNvPr id="1" name=""/>
-        <p:cNvGrpSpPr/>
-        <p:nvPr/>
-      </p:nvGrpSpPr>
-      <p:grpSpPr>
-        <a:xfrm>
-          <a:off x="0" y="0"/>
-          <a:ext cx="0" cy="0"/>
-          <a:chOff x="0" y="0"/>
-          <a:chExt cx="0" cy="0"/>
-        </a:xfrm>
-      </p:grpSpPr>
-      <p:grpSp>
-        <p:nvGrpSpPr>
-          <p:cNvPr id="63" name="Group 62"/>
-          <p:cNvGrpSpPr/>
-          <p:nvPr/>
-        </p:nvGrpSpPr>
-        <p:grpSpPr>
-          <a:xfrm>
-            <a:off x="1201410" y="2460260"/>
-            <a:ext cx="6627233" cy="3983975"/>
-            <a:chOff x="1208667" y="679118"/>
-            <a:chExt cx="8938223" cy="5373231"/>
-          </a:xfrm>
-        </p:grpSpPr>
-        <p:sp>
-          <p:nvSpPr>
-            <p:cNvPr id="7" name="Rectangle 6"/>
-            <p:cNvSpPr/>
-            <p:nvPr/>
-          </p:nvSpPr>
-          <p:spPr>
-            <a:xfrm>
-              <a:off x="1208667" y="2374490"/>
-              <a:ext cx="8938223" cy="3677859"/>
-            </a:xfrm>
-            <a:prstGeom prst="rect">
-              <a:avLst/>
-            </a:prstGeom>
-            <a:ln w="38100" cap="rnd">
-              <a:solidFill>
-                <a:schemeClr val="tx1"/>
-              </a:solidFill>
-              <a:round/>
-            </a:ln>
-          </p:spPr>
-          <p:style>
-            <a:lnRef idx="2">
-              <a:schemeClr val="accent6"/>
-            </a:lnRef>
-            <a:fillRef idx="1">
-              <a:schemeClr val="lt1"/>
-            </a:fillRef>
-            <a:effectRef idx="0">
-              <a:schemeClr val="accent6"/>
-            </a:effectRef>
-            <a:fontRef idx="minor">
-              <a:schemeClr val="dk1"/>
-            </a:fontRef>
-          </p:style>
-          <p:txBody>
-            <a:bodyPr rtlCol="0" anchor="ctr"/>
-            <a:lstStyle/>
-            <a:p>
-              <a:pPr algn="ctr"/>
-              <a:endParaRPr lang="en-US" sz="2400" b="1" dirty="0"/>
-            </a:p>
-          </p:txBody>
-        </p:sp>
-        <p:sp>
-          <p:nvSpPr>
-            <p:cNvPr id="42" name="Freeform 41"/>
-            <p:cNvSpPr/>
-            <p:nvPr/>
-          </p:nvSpPr>
-          <p:spPr>
-            <a:xfrm>
-              <a:off x="2711146" y="1756182"/>
-              <a:ext cx="269746" cy="2727551"/>
-            </a:xfrm>
-            <a:custGeom>
-              <a:avLst/>
-              <a:gdLst>
-                <a:gd name="connsiteX0" fmla="*/ 179538 w 179538"/>
-                <a:gd name="connsiteY0" fmla="*/ 0 h 2418736"/>
-                <a:gd name="connsiteX1" fmla="*/ 2557 w 179538"/>
-                <a:gd name="connsiteY1" fmla="*/ 1238865 h 2418736"/>
-                <a:gd name="connsiteX2" fmla="*/ 91048 w 179538"/>
-                <a:gd name="connsiteY2" fmla="*/ 2418736 h 2418736"/>
-              </a:gdLst>
-              <a:ahLst/>
-              <a:cxnLst>
-                <a:cxn ang="0">
-                  <a:pos x="connsiteX0" y="connsiteY0"/>
-                </a:cxn>
-                <a:cxn ang="0">
-                  <a:pos x="connsiteX1" y="connsiteY1"/>
-                </a:cxn>
-                <a:cxn ang="0">
-                  <a:pos x="connsiteX2" y="connsiteY2"/>
-                </a:cxn>
-              </a:cxnLst>
-              <a:rect l="l" t="t" r="r" b="b"/>
-              <a:pathLst>
-                <a:path w="179538" h="2418736">
-                  <a:moveTo>
-                    <a:pt x="179538" y="0"/>
-                  </a:moveTo>
-                  <a:cubicBezTo>
-                    <a:pt x="98421" y="417871"/>
-                    <a:pt x="17305" y="835742"/>
-                    <a:pt x="2557" y="1238865"/>
-                  </a:cubicBezTo>
-                  <a:cubicBezTo>
-                    <a:pt x="-12191" y="1641988"/>
-                    <a:pt x="39428" y="2030362"/>
-                    <a:pt x="91048" y="2418736"/>
-                  </a:cubicBezTo>
-                </a:path>
-              </a:pathLst>
-            </a:custGeom>
-            <a:noFill/>
-            <a:ln w="38100">
-              <a:solidFill>
-                <a:schemeClr val="tx1"/>
-              </a:solidFill>
-              <a:prstDash val="sysDash"/>
-              <a:headEnd type="triangle" w="lg" len="lg"/>
-            </a:ln>
-          </p:spPr>
-          <p:style>
-            <a:lnRef idx="2">
-              <a:schemeClr val="accent1">
-                <a:shade val="50000"/>
-              </a:schemeClr>
-            </a:lnRef>
-            <a:fillRef idx="1">
-              <a:schemeClr val="accent1"/>
-            </a:fillRef>
-            <a:effectRef idx="0">
-              <a:schemeClr val="accent1"/>
-            </a:effectRef>
-            <a:fontRef idx="minor">
-              <a:schemeClr val="lt1"/>
-            </a:fontRef>
-          </p:style>
-          <p:txBody>
-            <a:bodyPr rtlCol="0" anchor="ctr"/>
-            <a:lstStyle/>
-            <a:p>
-              <a:pPr algn="ctr"/>
-              <a:endParaRPr lang="en-US" sz="1200"/>
-            </a:p>
-          </p:txBody>
-        </p:sp>
-        <p:sp>
-          <p:nvSpPr>
-            <p:cNvPr id="43" name="Freeform 42"/>
-            <p:cNvSpPr/>
-            <p:nvPr/>
-          </p:nvSpPr>
-          <p:spPr>
-            <a:xfrm>
-              <a:off x="3834580" y="1756182"/>
-              <a:ext cx="1399795" cy="3176896"/>
-            </a:xfrm>
-            <a:custGeom>
-              <a:avLst/>
-              <a:gdLst>
-                <a:gd name="connsiteX0" fmla="*/ 0 w 1297858"/>
-                <a:gd name="connsiteY0" fmla="*/ 0 h 3008671"/>
-                <a:gd name="connsiteX1" fmla="*/ 235974 w 1297858"/>
-                <a:gd name="connsiteY1" fmla="*/ 1622323 h 3008671"/>
-                <a:gd name="connsiteX2" fmla="*/ 1297858 w 1297858"/>
-                <a:gd name="connsiteY2" fmla="*/ 3008671 h 3008671"/>
-              </a:gdLst>
-              <a:ahLst/>
-              <a:cxnLst>
-                <a:cxn ang="0">
-                  <a:pos x="connsiteX0" y="connsiteY0"/>
-                </a:cxn>
-                <a:cxn ang="0">
-                  <a:pos x="connsiteX1" y="connsiteY1"/>
-                </a:cxn>
-                <a:cxn ang="0">
-                  <a:pos x="connsiteX2" y="connsiteY2"/>
-                </a:cxn>
-              </a:cxnLst>
-              <a:rect l="l" t="t" r="r" b="b"/>
-              <a:pathLst>
-                <a:path w="1297858" h="3008671">
-                  <a:moveTo>
-                    <a:pt x="0" y="0"/>
-                  </a:moveTo>
-                  <a:cubicBezTo>
-                    <a:pt x="9832" y="560439"/>
-                    <a:pt x="19664" y="1120878"/>
-                    <a:pt x="235974" y="1622323"/>
-                  </a:cubicBezTo>
-                  <a:cubicBezTo>
-                    <a:pt x="452284" y="2123768"/>
-                    <a:pt x="1297858" y="3008671"/>
-                    <a:pt x="1297858" y="3008671"/>
-                  </a:cubicBezTo>
-                </a:path>
-              </a:pathLst>
-            </a:custGeom>
-            <a:noFill/>
-            <a:ln w="38100">
-              <a:solidFill>
-                <a:schemeClr val="tx1"/>
-              </a:solidFill>
-              <a:prstDash val="sysDash"/>
-              <a:headEnd type="triangle" w="lg" len="lg"/>
-            </a:ln>
-          </p:spPr>
-          <p:style>
-            <a:lnRef idx="2">
-              <a:schemeClr val="accent1">
-                <a:shade val="50000"/>
-              </a:schemeClr>
-            </a:lnRef>
-            <a:fillRef idx="1">
-              <a:schemeClr val="accent1"/>
-            </a:fillRef>
-            <a:effectRef idx="0">
-              <a:schemeClr val="accent1"/>
-            </a:effectRef>
-            <a:fontRef idx="minor">
-              <a:schemeClr val="lt1"/>
-            </a:fontRef>
-          </p:style>
-          <p:txBody>
-            <a:bodyPr rtlCol="0" anchor="ctr"/>
-            <a:lstStyle/>
-            <a:p>
-              <a:pPr algn="ctr"/>
-              <a:endParaRPr lang="en-US" sz="1200"/>
-            </a:p>
-          </p:txBody>
-        </p:sp>
-        <p:sp>
-          <p:nvSpPr>
-            <p:cNvPr id="44" name="Freeform 43"/>
-            <p:cNvSpPr/>
-            <p:nvPr/>
-          </p:nvSpPr>
-          <p:spPr>
-            <a:xfrm>
-              <a:off x="5309420" y="1455800"/>
-              <a:ext cx="370062" cy="1770740"/>
-            </a:xfrm>
-            <a:custGeom>
-              <a:avLst/>
-              <a:gdLst>
-                <a:gd name="connsiteX0" fmla="*/ 0 w 443991"/>
-                <a:gd name="connsiteY0" fmla="*/ 4290 h 1449632"/>
-                <a:gd name="connsiteX1" fmla="*/ 265471 w 443991"/>
-                <a:gd name="connsiteY1" fmla="*/ 181271 h 1449632"/>
-                <a:gd name="connsiteX2" fmla="*/ 383458 w 443991"/>
-                <a:gd name="connsiteY2" fmla="*/ 1184161 h 1449632"/>
-                <a:gd name="connsiteX3" fmla="*/ 442452 w 443991"/>
-                <a:gd name="connsiteY3" fmla="*/ 1449632 h 1449632"/>
-              </a:gdLst>
-              <a:ahLst/>
-              <a:cxnLst>
-                <a:cxn ang="0">
-                  <a:pos x="connsiteX0" y="connsiteY0"/>
-                </a:cxn>
-                <a:cxn ang="0">
-                  <a:pos x="connsiteX1" y="connsiteY1"/>
-                </a:cxn>
-                <a:cxn ang="0">
-                  <a:pos x="connsiteX2" y="connsiteY2"/>
-                </a:cxn>
-                <a:cxn ang="0">
-                  <a:pos x="connsiteX3" y="connsiteY3"/>
-                </a:cxn>
-              </a:cxnLst>
-              <a:rect l="l" t="t" r="r" b="b"/>
-              <a:pathLst>
-                <a:path w="443991" h="1449632">
-                  <a:moveTo>
-                    <a:pt x="0" y="4290"/>
-                  </a:moveTo>
-                  <a:cubicBezTo>
-                    <a:pt x="100780" y="-5542"/>
-                    <a:pt x="201561" y="-15374"/>
-                    <a:pt x="265471" y="181271"/>
-                  </a:cubicBezTo>
-                  <a:cubicBezTo>
-                    <a:pt x="329381" y="377916"/>
-                    <a:pt x="353961" y="972768"/>
-                    <a:pt x="383458" y="1184161"/>
-                  </a:cubicBezTo>
-                  <a:cubicBezTo>
-                    <a:pt x="412955" y="1395554"/>
-                    <a:pt x="452284" y="1385722"/>
-                    <a:pt x="442452" y="1449632"/>
-                  </a:cubicBezTo>
-                </a:path>
-              </a:pathLst>
-            </a:custGeom>
-            <a:noFill/>
-            <a:ln w="38100">
-              <a:solidFill>
-                <a:schemeClr val="tx1"/>
-              </a:solidFill>
-              <a:prstDash val="sysDash"/>
-              <a:headEnd type="triangle" w="lg" len="lg"/>
-            </a:ln>
-          </p:spPr>
-          <p:style>
-            <a:lnRef idx="2">
-              <a:schemeClr val="accent1">
-                <a:shade val="50000"/>
-              </a:schemeClr>
-            </a:lnRef>
-            <a:fillRef idx="1">
-              <a:schemeClr val="accent1"/>
-            </a:fillRef>
-            <a:effectRef idx="0">
-              <a:schemeClr val="accent1"/>
-            </a:effectRef>
-            <a:fontRef idx="minor">
-              <a:schemeClr val="lt1"/>
-            </a:fontRef>
-          </p:style>
-          <p:txBody>
-            <a:bodyPr rtlCol="0" anchor="ctr"/>
-            <a:lstStyle/>
-            <a:p>
-              <a:pPr algn="ctr"/>
-              <a:endParaRPr lang="en-US" sz="1200"/>
-            </a:p>
-          </p:txBody>
-        </p:sp>
-        <p:sp>
-          <p:nvSpPr>
-            <p:cNvPr id="45" name="Freeform 44"/>
-            <p:cNvSpPr/>
-            <p:nvPr/>
-          </p:nvSpPr>
-          <p:spPr>
-            <a:xfrm>
-              <a:off x="8616837" y="1756183"/>
-              <a:ext cx="146300" cy="2393565"/>
-            </a:xfrm>
-            <a:custGeom>
-              <a:avLst/>
-              <a:gdLst>
-                <a:gd name="connsiteX0" fmla="*/ 58994 w 236687"/>
-                <a:gd name="connsiteY0" fmla="*/ 2271251 h 2271251"/>
-                <a:gd name="connsiteX1" fmla="*/ 235974 w 236687"/>
-                <a:gd name="connsiteY1" fmla="*/ 1091380 h 2271251"/>
-                <a:gd name="connsiteX2" fmla="*/ 0 w 236687"/>
-                <a:gd name="connsiteY2" fmla="*/ 0 h 2271251"/>
-              </a:gdLst>
-              <a:ahLst/>
-              <a:cxnLst>
-                <a:cxn ang="0">
-                  <a:pos x="connsiteX0" y="connsiteY0"/>
-                </a:cxn>
-                <a:cxn ang="0">
-                  <a:pos x="connsiteX1" y="connsiteY1"/>
-                </a:cxn>
-                <a:cxn ang="0">
-                  <a:pos x="connsiteX2" y="connsiteY2"/>
-                </a:cxn>
-              </a:cxnLst>
-              <a:rect l="l" t="t" r="r" b="b"/>
-              <a:pathLst>
-                <a:path w="236687" h="2271251">
-                  <a:moveTo>
-                    <a:pt x="58994" y="2271251"/>
-                  </a:moveTo>
-                  <a:cubicBezTo>
-                    <a:pt x="152400" y="1870586"/>
-                    <a:pt x="245806" y="1469922"/>
-                    <a:pt x="235974" y="1091380"/>
-                  </a:cubicBezTo>
-                  <a:cubicBezTo>
-                    <a:pt x="226142" y="712838"/>
-                    <a:pt x="19664" y="196645"/>
-                    <a:pt x="0" y="0"/>
-                  </a:cubicBezTo>
-                </a:path>
-              </a:pathLst>
-            </a:custGeom>
-            <a:noFill/>
-            <a:ln w="38100">
-              <a:solidFill>
-                <a:schemeClr val="tx1"/>
-              </a:solidFill>
-              <a:prstDash val="sysDash"/>
-              <a:headEnd type="none" w="lg" len="lg"/>
-              <a:tailEnd type="triangle" w="lg" len="lg"/>
-            </a:ln>
-          </p:spPr>
-          <p:style>
-            <a:lnRef idx="2">
-              <a:schemeClr val="accent1">
-                <a:shade val="50000"/>
-              </a:schemeClr>
-            </a:lnRef>
-            <a:fillRef idx="1">
-              <a:schemeClr val="accent1"/>
-            </a:fillRef>
-            <a:effectRef idx="0">
-              <a:schemeClr val="accent1"/>
-            </a:effectRef>
-            <a:fontRef idx="minor">
-              <a:schemeClr val="lt1"/>
-            </a:fontRef>
-          </p:style>
-          <p:txBody>
-            <a:bodyPr rtlCol="0" anchor="ctr"/>
-            <a:lstStyle/>
-            <a:p>
-              <a:pPr algn="ctr"/>
-              <a:endParaRPr lang="en-US" sz="1200"/>
-            </a:p>
-          </p:txBody>
-        </p:sp>
-        <p:sp>
-          <p:nvSpPr>
-            <p:cNvPr id="4" name="Rectangle 3"/>
-            <p:cNvSpPr/>
-            <p:nvPr/>
-          </p:nvSpPr>
-          <p:spPr>
-            <a:xfrm>
-              <a:off x="2329952" y="679118"/>
-              <a:ext cx="2851269" cy="956061"/>
-            </a:xfrm>
-            <a:prstGeom prst="rect">
-              <a:avLst/>
-            </a:prstGeom>
-            <a:ln w="38100" cap="rnd">
-              <a:solidFill>
-                <a:schemeClr val="tx1"/>
-              </a:solidFill>
-              <a:round/>
-            </a:ln>
-          </p:spPr>
-          <p:style>
-            <a:lnRef idx="2">
-              <a:schemeClr val="accent6"/>
-            </a:lnRef>
-            <a:fillRef idx="1">
-              <a:schemeClr val="lt1"/>
-            </a:fillRef>
-            <a:effectRef idx="0">
-              <a:schemeClr val="accent6"/>
-            </a:effectRef>
-            <a:fontRef idx="minor">
-              <a:schemeClr val="dk1"/>
-            </a:fontRef>
-          </p:style>
-          <p:txBody>
-            <a:bodyPr rtlCol="0" anchor="ctr"/>
-            <a:lstStyle/>
-            <a:p>
-              <a:pPr algn="ctr"/>
-              <a:r>
-                <a:rPr lang="en-US" sz="2400" b="1" dirty="0" smtClean="0"/>
-                <a:t>Controller 1</a:t>
-              </a:r>
-              <a:endParaRPr lang="en-US" sz="2400" b="1" dirty="0"/>
-            </a:p>
-          </p:txBody>
-        </p:sp>
-        <p:sp>
-          <p:nvSpPr>
-            <p:cNvPr id="5" name="Rectangle 4"/>
-            <p:cNvSpPr/>
-            <p:nvPr/>
-          </p:nvSpPr>
-          <p:spPr>
-            <a:xfrm>
-              <a:off x="6322832" y="679118"/>
-              <a:ext cx="2851269" cy="956061"/>
-            </a:xfrm>
-            <a:prstGeom prst="rect">
-              <a:avLst/>
-            </a:prstGeom>
-            <a:ln w="38100" cap="rnd">
-              <a:solidFill>
-                <a:schemeClr val="tx1"/>
-              </a:solidFill>
-              <a:round/>
-            </a:ln>
-          </p:spPr>
-          <p:style>
-            <a:lnRef idx="2">
-              <a:schemeClr val="accent6"/>
-            </a:lnRef>
-            <a:fillRef idx="1">
-              <a:schemeClr val="lt1"/>
-            </a:fillRef>
-            <a:effectRef idx="0">
-              <a:schemeClr val="accent6"/>
-            </a:effectRef>
-            <a:fontRef idx="minor">
-              <a:schemeClr val="dk1"/>
-            </a:fontRef>
-          </p:style>
-          <p:txBody>
-            <a:bodyPr rtlCol="0" anchor="ctr"/>
-            <a:lstStyle/>
-            <a:p>
-              <a:pPr algn="ctr"/>
-              <a:r>
-                <a:rPr lang="en-US" sz="2400" b="1" dirty="0" smtClean="0"/>
-                <a:t>Controller N</a:t>
-              </a:r>
-              <a:endParaRPr lang="en-US" sz="2400" b="1" dirty="0"/>
-            </a:p>
-          </p:txBody>
-        </p:sp>
-        <p:cxnSp>
-          <p:nvCxnSpPr>
-            <p:cNvPr id="6" name="Straight Connector 5"/>
-            <p:cNvCxnSpPr/>
-            <p:nvPr/>
-          </p:nvCxnSpPr>
-          <p:spPr>
-            <a:xfrm>
-              <a:off x="5597848" y="1020214"/>
-              <a:ext cx="455949" cy="0"/>
-            </a:xfrm>
-            <a:prstGeom prst="line">
-              <a:avLst/>
-            </a:prstGeom>
-            <a:ln w="63500">
-              <a:solidFill>
-                <a:schemeClr val="tx1"/>
-              </a:solidFill>
-              <a:prstDash val="sysDot"/>
-            </a:ln>
-          </p:spPr>
-          <p:style>
-            <a:lnRef idx="1">
-              <a:schemeClr val="accent1"/>
-            </a:lnRef>
-            <a:fillRef idx="0">
-              <a:schemeClr val="accent1"/>
-            </a:fillRef>
-            <a:effectRef idx="0">
-              <a:schemeClr val="accent1"/>
-            </a:effectRef>
-            <a:fontRef idx="minor">
-              <a:schemeClr val="tx1"/>
-            </a:fontRef>
-          </p:style>
-        </p:cxnSp>
-        <p:sp>
-          <p:nvSpPr>
-            <p:cNvPr id="8" name="Rectangle 7"/>
-            <p:cNvSpPr/>
-            <p:nvPr/>
-          </p:nvSpPr>
-          <p:spPr>
-            <a:xfrm>
-              <a:off x="1362696" y="5132167"/>
-              <a:ext cx="3656612" cy="788692"/>
-            </a:xfrm>
-            <a:prstGeom prst="rect">
-              <a:avLst/>
-            </a:prstGeom>
-          </p:spPr>
-          <p:txBody>
-            <a:bodyPr wrap="none">
-              <a:spAutoFit/>
-            </a:bodyPr>
-            <a:lstStyle/>
-            <a:p>
-              <a:pPr algn="ctr"/>
-              <a:r>
-                <a:rPr lang="en-US" sz="3200" b="1" dirty="0" smtClean="0"/>
-                <a:t>Mock Network</a:t>
-              </a:r>
-              <a:endParaRPr lang="en-US" sz="3200" b="1" dirty="0"/>
-            </a:p>
-          </p:txBody>
-        </p:sp>
-        <p:cxnSp>
-          <p:nvCxnSpPr>
-            <p:cNvPr id="36" name="Straight Connector 35"/>
-            <p:cNvCxnSpPr/>
-            <p:nvPr/>
-          </p:nvCxnSpPr>
-          <p:spPr>
-            <a:xfrm flipH="1" flipV="1">
-              <a:off x="3015724" y="4273975"/>
-              <a:ext cx="1985971" cy="495592"/>
-            </a:xfrm>
-            <a:prstGeom prst="line">
-              <a:avLst/>
-            </a:prstGeom>
-            <a:ln w="63500">
-              <a:solidFill>
-                <a:schemeClr val="tx1"/>
-              </a:solidFill>
-              <a:prstDash val="solid"/>
-            </a:ln>
-          </p:spPr>
-          <p:style>
-            <a:lnRef idx="1">
-              <a:schemeClr val="accent1"/>
-            </a:lnRef>
-            <a:fillRef idx="0">
-              <a:schemeClr val="accent1"/>
-            </a:fillRef>
-            <a:effectRef idx="0">
-              <a:schemeClr val="accent1"/>
-            </a:effectRef>
-            <a:fontRef idx="minor">
-              <a:schemeClr val="tx1"/>
-            </a:fontRef>
-          </p:style>
-        </p:cxnSp>
-        <p:cxnSp>
-          <p:nvCxnSpPr>
-            <p:cNvPr id="39" name="Straight Connector 38"/>
-            <p:cNvCxnSpPr/>
-            <p:nvPr/>
-          </p:nvCxnSpPr>
-          <p:spPr>
-            <a:xfrm flipH="1">
-              <a:off x="5380675" y="4053375"/>
-              <a:ext cx="3043094" cy="699668"/>
-            </a:xfrm>
-            <a:prstGeom prst="line">
-              <a:avLst/>
-            </a:prstGeom>
-            <a:ln w="63500">
-              <a:solidFill>
-                <a:schemeClr val="tx1"/>
-              </a:solidFill>
-              <a:prstDash val="solid"/>
-            </a:ln>
-          </p:spPr>
-          <p:style>
-            <a:lnRef idx="1">
-              <a:schemeClr val="accent1"/>
-            </a:lnRef>
-            <a:fillRef idx="0">
-              <a:schemeClr val="accent1"/>
-            </a:fillRef>
-            <a:effectRef idx="0">
-              <a:schemeClr val="accent1"/>
-            </a:effectRef>
-            <a:fontRef idx="minor">
-              <a:schemeClr val="tx1"/>
-            </a:fontRef>
-          </p:style>
-        </p:cxnSp>
-        <p:sp>
-          <p:nvSpPr>
-            <p:cNvPr id="46" name="Freeform 45"/>
-            <p:cNvSpPr/>
-            <p:nvPr/>
-          </p:nvSpPr>
-          <p:spPr>
-            <a:xfrm flipH="1">
-              <a:off x="5858761" y="1455800"/>
-              <a:ext cx="319097" cy="1770740"/>
-            </a:xfrm>
-            <a:custGeom>
-              <a:avLst/>
-              <a:gdLst>
-                <a:gd name="connsiteX0" fmla="*/ 0 w 443991"/>
-                <a:gd name="connsiteY0" fmla="*/ 4290 h 1449632"/>
-                <a:gd name="connsiteX1" fmla="*/ 265471 w 443991"/>
-                <a:gd name="connsiteY1" fmla="*/ 181271 h 1449632"/>
-                <a:gd name="connsiteX2" fmla="*/ 383458 w 443991"/>
-                <a:gd name="connsiteY2" fmla="*/ 1184161 h 1449632"/>
-                <a:gd name="connsiteX3" fmla="*/ 442452 w 443991"/>
-                <a:gd name="connsiteY3" fmla="*/ 1449632 h 1449632"/>
-              </a:gdLst>
-              <a:ahLst/>
-              <a:cxnLst>
-                <a:cxn ang="0">
-                  <a:pos x="connsiteX0" y="connsiteY0"/>
-                </a:cxn>
-                <a:cxn ang="0">
-                  <a:pos x="connsiteX1" y="connsiteY1"/>
-                </a:cxn>
-                <a:cxn ang="0">
-                  <a:pos x="connsiteX2" y="connsiteY2"/>
-                </a:cxn>
-                <a:cxn ang="0">
-                  <a:pos x="connsiteX3" y="connsiteY3"/>
-                </a:cxn>
-              </a:cxnLst>
-              <a:rect l="l" t="t" r="r" b="b"/>
-              <a:pathLst>
-                <a:path w="443991" h="1449632">
-                  <a:moveTo>
-                    <a:pt x="0" y="4290"/>
-                  </a:moveTo>
-                  <a:cubicBezTo>
-                    <a:pt x="100780" y="-5542"/>
-                    <a:pt x="201561" y="-15374"/>
-                    <a:pt x="265471" y="181271"/>
-                  </a:cubicBezTo>
-                  <a:cubicBezTo>
-                    <a:pt x="329381" y="377916"/>
-                    <a:pt x="353961" y="972768"/>
-                    <a:pt x="383458" y="1184161"/>
-                  </a:cubicBezTo>
-                  <a:cubicBezTo>
-                    <a:pt x="412955" y="1395554"/>
-                    <a:pt x="452284" y="1385722"/>
-                    <a:pt x="442452" y="1449632"/>
-                  </a:cubicBezTo>
-                </a:path>
-              </a:pathLst>
-            </a:custGeom>
-            <a:noFill/>
-            <a:ln w="38100">
-              <a:solidFill>
-                <a:schemeClr val="tx1"/>
-              </a:solidFill>
-              <a:prstDash val="sysDash"/>
-              <a:headEnd type="triangle" w="lg" len="lg"/>
-            </a:ln>
-          </p:spPr>
-          <p:style>
-            <a:lnRef idx="2">
-              <a:schemeClr val="accent1">
-                <a:shade val="50000"/>
-              </a:schemeClr>
-            </a:lnRef>
-            <a:fillRef idx="1">
-              <a:schemeClr val="accent1"/>
-            </a:fillRef>
-            <a:effectRef idx="0">
-              <a:schemeClr val="accent1"/>
-            </a:effectRef>
-            <a:fontRef idx="minor">
-              <a:schemeClr val="lt1"/>
-            </a:fontRef>
-          </p:style>
-          <p:txBody>
-            <a:bodyPr rtlCol="0" anchor="ctr"/>
-            <a:lstStyle/>
-            <a:p>
-              <a:pPr algn="ctr"/>
-              <a:endParaRPr lang="en-US" sz="1200"/>
-            </a:p>
-          </p:txBody>
-        </p:sp>
-        <p:grpSp>
-          <p:nvGrpSpPr>
-            <p:cNvPr id="28" name="Group 27"/>
-            <p:cNvGrpSpPr/>
-            <p:nvPr/>
-          </p:nvGrpSpPr>
-          <p:grpSpPr>
-            <a:xfrm>
-              <a:off x="6730356" y="4141911"/>
-              <a:ext cx="455949" cy="455949"/>
-              <a:chOff x="4456450" y="-1448314"/>
-              <a:chExt cx="678426" cy="678426"/>
-            </a:xfrm>
-          </p:grpSpPr>
-          <p:sp>
-            <p:nvSpPr>
-              <p:cNvPr id="12" name="Oval 11"/>
-              <p:cNvSpPr/>
-              <p:nvPr/>
-            </p:nvSpPr>
-            <p:spPr>
-              <a:xfrm>
-                <a:off x="4456450" y="-1448314"/>
-                <a:ext cx="678426" cy="678426"/>
-              </a:xfrm>
-              <a:prstGeom prst="ellipse">
-                <a:avLst/>
-              </a:prstGeom>
-              <a:solidFill>
-                <a:schemeClr val="bg1"/>
-              </a:solidFill>
-              <a:ln w="25400">
-                <a:solidFill>
-                  <a:schemeClr val="tx1"/>
-                </a:solidFill>
-              </a:ln>
-            </p:spPr>
-            <p:style>
-              <a:lnRef idx="2">
-                <a:schemeClr val="accent1">
-                  <a:shade val="50000"/>
-                </a:schemeClr>
-              </a:lnRef>
-              <a:fillRef idx="1">
-                <a:schemeClr val="accent1"/>
-              </a:fillRef>
-              <a:effectRef idx="0">
-                <a:schemeClr val="accent1"/>
-              </a:effectRef>
-              <a:fontRef idx="minor">
-                <a:schemeClr val="lt1"/>
-              </a:fontRef>
-            </p:style>
-            <p:txBody>
-              <a:bodyPr rtlCol="0" anchor="ctr"/>
-              <a:lstStyle/>
-              <a:p>
-                <a:pPr algn="ctr"/>
-                <a:endParaRPr lang="en-US" sz="1200"/>
-              </a:p>
-            </p:txBody>
-          </p:sp>
-          <p:sp>
-            <p:nvSpPr>
-              <p:cNvPr id="27" name="Freeform 26"/>
-              <p:cNvSpPr/>
-              <p:nvPr/>
-            </p:nvSpPr>
-            <p:spPr>
-              <a:xfrm rot="21050746">
-                <a:off x="4483242" y="-1215622"/>
-                <a:ext cx="651633" cy="263842"/>
-              </a:xfrm>
-              <a:custGeom>
-                <a:avLst/>
-                <a:gdLst>
-                  <a:gd name="connsiteX0" fmla="*/ 0 w 929640"/>
-                  <a:gd name="connsiteY0" fmla="*/ 95277 h 211726"/>
-                  <a:gd name="connsiteX1" fmla="*/ 289560 w 929640"/>
-                  <a:gd name="connsiteY1" fmla="*/ 3837 h 211726"/>
-                  <a:gd name="connsiteX2" fmla="*/ 647700 w 929640"/>
-                  <a:gd name="connsiteY2" fmla="*/ 209577 h 211726"/>
-                  <a:gd name="connsiteX3" fmla="*/ 929640 w 929640"/>
-                  <a:gd name="connsiteY3" fmla="*/ 110517 h 211726"/>
-                </a:gdLst>
-                <a:ahLst/>
-                <a:cxnLst>
-                  <a:cxn ang="0">
-                    <a:pos x="connsiteX0" y="connsiteY0"/>
-                  </a:cxn>
-                  <a:cxn ang="0">
-                    <a:pos x="connsiteX1" y="connsiteY1"/>
-                  </a:cxn>
-                  <a:cxn ang="0">
-                    <a:pos x="connsiteX2" y="connsiteY2"/>
-                  </a:cxn>
-                  <a:cxn ang="0">
-                    <a:pos x="connsiteX3" y="connsiteY3"/>
-                  </a:cxn>
-                </a:cxnLst>
-                <a:rect l="l" t="t" r="r" b="b"/>
-                <a:pathLst>
-                  <a:path w="929640" h="211726">
-                    <a:moveTo>
-                      <a:pt x="0" y="95277"/>
-                    </a:moveTo>
-                    <a:cubicBezTo>
-                      <a:pt x="90805" y="40032"/>
-                      <a:pt x="181610" y="-15213"/>
-                      <a:pt x="289560" y="3837"/>
-                    </a:cubicBezTo>
-                    <a:cubicBezTo>
-                      <a:pt x="397510" y="22887"/>
-                      <a:pt x="541020" y="191797"/>
-                      <a:pt x="647700" y="209577"/>
-                    </a:cubicBezTo>
-                    <a:cubicBezTo>
-                      <a:pt x="754380" y="227357"/>
-                      <a:pt x="891540" y="129567"/>
-                      <a:pt x="929640" y="110517"/>
-                    </a:cubicBezTo>
-                  </a:path>
-                </a:pathLst>
-              </a:custGeom>
-              <a:noFill/>
-              <a:ln w="25400">
-                <a:solidFill>
-                  <a:schemeClr val="tx1"/>
-                </a:solidFill>
-              </a:ln>
-            </p:spPr>
-            <p:style>
-              <a:lnRef idx="2">
-                <a:schemeClr val="accent1">
-                  <a:shade val="50000"/>
-                </a:schemeClr>
-              </a:lnRef>
-              <a:fillRef idx="1">
-                <a:schemeClr val="accent1"/>
-              </a:fillRef>
-              <a:effectRef idx="0">
-                <a:schemeClr val="accent1"/>
-              </a:effectRef>
-              <a:fontRef idx="minor">
-                <a:schemeClr val="lt1"/>
-              </a:fontRef>
-            </p:style>
-            <p:txBody>
-              <a:bodyPr rtlCol="0" anchor="ctr"/>
-              <a:lstStyle/>
-              <a:p>
-                <a:pPr algn="ctr"/>
-                <a:endParaRPr lang="en-US" sz="1200"/>
-              </a:p>
-            </p:txBody>
-          </p:sp>
-        </p:grpSp>
-        <p:grpSp>
-          <p:nvGrpSpPr>
-            <p:cNvPr id="30" name="Group 29"/>
-            <p:cNvGrpSpPr/>
-            <p:nvPr/>
-          </p:nvGrpSpPr>
-          <p:grpSpPr>
-            <a:xfrm>
-              <a:off x="5532857" y="3122293"/>
-              <a:ext cx="455949" cy="455949"/>
-              <a:chOff x="4456450" y="-556016"/>
-              <a:chExt cx="678426" cy="678426"/>
-            </a:xfrm>
-          </p:grpSpPr>
-          <p:sp>
-            <p:nvSpPr>
-              <p:cNvPr id="31" name="Oval 30"/>
-              <p:cNvSpPr/>
-              <p:nvPr/>
-            </p:nvSpPr>
-            <p:spPr>
-              <a:xfrm>
-                <a:off x="4456450" y="-556016"/>
-                <a:ext cx="678426" cy="678426"/>
-              </a:xfrm>
-              <a:prstGeom prst="ellipse">
-                <a:avLst/>
-              </a:prstGeom>
-              <a:solidFill>
-                <a:schemeClr val="bg1"/>
-              </a:solidFill>
-              <a:ln w="25400">
-                <a:solidFill>
-                  <a:schemeClr val="tx1"/>
-                </a:solidFill>
-              </a:ln>
-            </p:spPr>
-            <p:style>
-              <a:lnRef idx="2">
-                <a:schemeClr val="accent1">
-                  <a:shade val="50000"/>
-                </a:schemeClr>
-              </a:lnRef>
-              <a:fillRef idx="1">
-                <a:schemeClr val="accent1"/>
-              </a:fillRef>
-              <a:effectRef idx="0">
-                <a:schemeClr val="accent1"/>
-              </a:effectRef>
-              <a:fontRef idx="minor">
-                <a:schemeClr val="lt1"/>
-              </a:fontRef>
-            </p:style>
-            <p:txBody>
-              <a:bodyPr rtlCol="0" anchor="ctr"/>
-              <a:lstStyle/>
-              <a:p>
-                <a:pPr algn="ctr"/>
-                <a:endParaRPr lang="en-US" sz="1200"/>
-              </a:p>
-            </p:txBody>
-          </p:sp>
-          <p:sp>
-            <p:nvSpPr>
-              <p:cNvPr id="32" name="Freeform 31"/>
-              <p:cNvSpPr/>
-              <p:nvPr/>
-            </p:nvSpPr>
-            <p:spPr>
-              <a:xfrm rot="21050746">
-                <a:off x="4483242" y="-323324"/>
-                <a:ext cx="651633" cy="263842"/>
-              </a:xfrm>
-              <a:custGeom>
-                <a:avLst/>
-                <a:gdLst>
-                  <a:gd name="connsiteX0" fmla="*/ 0 w 929640"/>
-                  <a:gd name="connsiteY0" fmla="*/ 95277 h 211726"/>
-                  <a:gd name="connsiteX1" fmla="*/ 289560 w 929640"/>
-                  <a:gd name="connsiteY1" fmla="*/ 3837 h 211726"/>
-                  <a:gd name="connsiteX2" fmla="*/ 647700 w 929640"/>
-                  <a:gd name="connsiteY2" fmla="*/ 209577 h 211726"/>
-                  <a:gd name="connsiteX3" fmla="*/ 929640 w 929640"/>
-                  <a:gd name="connsiteY3" fmla="*/ 110517 h 211726"/>
-                </a:gdLst>
-                <a:ahLst/>
-                <a:cxnLst>
-                  <a:cxn ang="0">
-                    <a:pos x="connsiteX0" y="connsiteY0"/>
-                  </a:cxn>
-                  <a:cxn ang="0">
-                    <a:pos x="connsiteX1" y="connsiteY1"/>
-                  </a:cxn>
-                  <a:cxn ang="0">
-                    <a:pos x="connsiteX2" y="connsiteY2"/>
-                  </a:cxn>
-                  <a:cxn ang="0">
-                    <a:pos x="connsiteX3" y="connsiteY3"/>
-                  </a:cxn>
-                </a:cxnLst>
-                <a:rect l="l" t="t" r="r" b="b"/>
-                <a:pathLst>
-                  <a:path w="929640" h="211726">
-                    <a:moveTo>
-                      <a:pt x="0" y="95277"/>
-                    </a:moveTo>
-                    <a:cubicBezTo>
-                      <a:pt x="90805" y="40032"/>
-                      <a:pt x="181610" y="-15213"/>
-                      <a:pt x="289560" y="3837"/>
-                    </a:cubicBezTo>
-                    <a:cubicBezTo>
-                      <a:pt x="397510" y="22887"/>
-                      <a:pt x="541020" y="191797"/>
-                      <a:pt x="647700" y="209577"/>
-                    </a:cubicBezTo>
-                    <a:cubicBezTo>
-                      <a:pt x="754380" y="227357"/>
-                      <a:pt x="891540" y="129567"/>
-                      <a:pt x="929640" y="110517"/>
-                    </a:cubicBezTo>
-                  </a:path>
-                </a:pathLst>
-              </a:custGeom>
-              <a:noFill/>
-              <a:ln w="25400">
-                <a:solidFill>
-                  <a:schemeClr val="tx1"/>
-                </a:solidFill>
-              </a:ln>
-            </p:spPr>
-            <p:style>
-              <a:lnRef idx="2">
-                <a:schemeClr val="accent1">
-                  <a:shade val="50000"/>
-                </a:schemeClr>
-              </a:lnRef>
-              <a:fillRef idx="1">
-                <a:schemeClr val="accent1"/>
-              </a:fillRef>
-              <a:effectRef idx="0">
-                <a:schemeClr val="accent1"/>
-              </a:effectRef>
-              <a:fontRef idx="minor">
-                <a:schemeClr val="lt1"/>
-              </a:fontRef>
-            </p:style>
-            <p:txBody>
-              <a:bodyPr rtlCol="0" anchor="ctr"/>
-              <a:lstStyle/>
-              <a:p>
-                <a:pPr algn="ctr"/>
-                <a:endParaRPr lang="en-US" sz="1200"/>
-              </a:p>
-            </p:txBody>
-          </p:sp>
-        </p:grpSp>
-        <p:grpSp>
-          <p:nvGrpSpPr>
-            <p:cNvPr id="33" name="Group 32"/>
-            <p:cNvGrpSpPr/>
-            <p:nvPr/>
-          </p:nvGrpSpPr>
-          <p:grpSpPr>
-            <a:xfrm>
-              <a:off x="8506387" y="2685542"/>
-              <a:ext cx="455949" cy="455949"/>
-              <a:chOff x="4456450" y="-807966"/>
-              <a:chExt cx="678426" cy="678426"/>
-            </a:xfrm>
-          </p:grpSpPr>
-          <p:sp>
-            <p:nvSpPr>
-              <p:cNvPr id="34" name="Oval 33"/>
-              <p:cNvSpPr/>
-              <p:nvPr/>
-            </p:nvSpPr>
-            <p:spPr>
-              <a:xfrm>
-                <a:off x="4456450" y="-807966"/>
-                <a:ext cx="678426" cy="678426"/>
-              </a:xfrm>
-              <a:prstGeom prst="ellipse">
-                <a:avLst/>
-              </a:prstGeom>
-              <a:solidFill>
-                <a:schemeClr val="bg1"/>
-              </a:solidFill>
-              <a:ln w="25400">
-                <a:solidFill>
-                  <a:schemeClr val="tx1"/>
-                </a:solidFill>
-              </a:ln>
-            </p:spPr>
-            <p:style>
-              <a:lnRef idx="2">
-                <a:schemeClr val="accent1">
-                  <a:shade val="50000"/>
-                </a:schemeClr>
-              </a:lnRef>
-              <a:fillRef idx="1">
-                <a:schemeClr val="accent1"/>
-              </a:fillRef>
-              <a:effectRef idx="0">
-                <a:schemeClr val="accent1"/>
-              </a:effectRef>
-              <a:fontRef idx="minor">
-                <a:schemeClr val="lt1"/>
-              </a:fontRef>
-            </p:style>
-            <p:txBody>
-              <a:bodyPr rtlCol="0" anchor="ctr"/>
-              <a:lstStyle/>
-              <a:p>
-                <a:pPr algn="ctr"/>
-                <a:endParaRPr lang="en-US" sz="1200"/>
-              </a:p>
-            </p:txBody>
-          </p:sp>
-          <p:sp>
-            <p:nvSpPr>
-              <p:cNvPr id="35" name="Freeform 34"/>
-              <p:cNvSpPr/>
-              <p:nvPr/>
-            </p:nvSpPr>
-            <p:spPr>
-              <a:xfrm rot="21050746">
-                <a:off x="4483242" y="-575274"/>
-                <a:ext cx="651633" cy="263842"/>
-              </a:xfrm>
-              <a:custGeom>
-                <a:avLst/>
-                <a:gdLst>
-                  <a:gd name="connsiteX0" fmla="*/ 0 w 929640"/>
-                  <a:gd name="connsiteY0" fmla="*/ 95277 h 211726"/>
-                  <a:gd name="connsiteX1" fmla="*/ 289560 w 929640"/>
-                  <a:gd name="connsiteY1" fmla="*/ 3837 h 211726"/>
-                  <a:gd name="connsiteX2" fmla="*/ 647700 w 929640"/>
-                  <a:gd name="connsiteY2" fmla="*/ 209577 h 211726"/>
-                  <a:gd name="connsiteX3" fmla="*/ 929640 w 929640"/>
-                  <a:gd name="connsiteY3" fmla="*/ 110517 h 211726"/>
-                </a:gdLst>
-                <a:ahLst/>
-                <a:cxnLst>
-                  <a:cxn ang="0">
-                    <a:pos x="connsiteX0" y="connsiteY0"/>
-                  </a:cxn>
-                  <a:cxn ang="0">
-                    <a:pos x="connsiteX1" y="connsiteY1"/>
-                  </a:cxn>
-                  <a:cxn ang="0">
-                    <a:pos x="connsiteX2" y="connsiteY2"/>
-                  </a:cxn>
-                  <a:cxn ang="0">
-                    <a:pos x="connsiteX3" y="connsiteY3"/>
-                  </a:cxn>
-                </a:cxnLst>
-                <a:rect l="l" t="t" r="r" b="b"/>
-                <a:pathLst>
-                  <a:path w="929640" h="211726">
-                    <a:moveTo>
-                      <a:pt x="0" y="95277"/>
-                    </a:moveTo>
-                    <a:cubicBezTo>
-                      <a:pt x="90805" y="40032"/>
-                      <a:pt x="181610" y="-15213"/>
-                      <a:pt x="289560" y="3837"/>
-                    </a:cubicBezTo>
-                    <a:cubicBezTo>
-                      <a:pt x="397510" y="22887"/>
-                      <a:pt x="541020" y="191797"/>
-                      <a:pt x="647700" y="209577"/>
-                    </a:cubicBezTo>
-                    <a:cubicBezTo>
-                      <a:pt x="754380" y="227357"/>
-                      <a:pt x="891540" y="129567"/>
-                      <a:pt x="929640" y="110517"/>
-                    </a:cubicBezTo>
-                  </a:path>
-                </a:pathLst>
-              </a:custGeom>
-              <a:noFill/>
-              <a:ln w="25400">
-                <a:solidFill>
-                  <a:schemeClr val="tx1"/>
-                </a:solidFill>
-              </a:ln>
-            </p:spPr>
-            <p:style>
-              <a:lnRef idx="2">
-                <a:schemeClr val="accent1">
-                  <a:shade val="50000"/>
-                </a:schemeClr>
-              </a:lnRef>
-              <a:fillRef idx="1">
-                <a:schemeClr val="accent1"/>
-              </a:fillRef>
-              <a:effectRef idx="0">
-                <a:schemeClr val="accent1"/>
-              </a:effectRef>
-              <a:fontRef idx="minor">
-                <a:schemeClr val="lt1"/>
-              </a:fontRef>
-            </p:style>
-            <p:txBody>
-              <a:bodyPr rtlCol="0" anchor="ctr"/>
-              <a:lstStyle/>
-              <a:p>
-                <a:pPr algn="ctr"/>
-                <a:endParaRPr lang="en-US" sz="1200"/>
-              </a:p>
-            </p:txBody>
-          </p:sp>
-        </p:grpSp>
-        <p:pic>
-          <p:nvPicPr>
-            <p:cNvPr id="1026" name="Picture 2" descr="http://www.clker.com/cliparts/4/3/a/5/1195424143626751174switch_jakub_angelis_01.svg.med.png"/>
-            <p:cNvPicPr>
-              <a:picLocks noChangeAspect="1" noChangeArrowheads="1"/>
-            </p:cNvPicPr>
-            <p:nvPr/>
-          </p:nvPicPr>
-          <p:blipFill>
-            <a:blip r:embed="rId2" cstate="print">
-              <a:extLst>
-                <a:ext uri="{28A0092B-C50C-407E-A947-70E740481C1C}">
-                  <a14:useLocalDpi xmlns:a14="http://schemas.microsoft.com/office/drawing/2010/main" val="0"/>
-                </a:ext>
-              </a:extLst>
-            </a:blip>
-            <a:srcRect/>
-            <a:stretch>
-              <a:fillRect/>
-            </a:stretch>
-          </p:blipFill>
-          <p:spPr bwMode="auto">
-            <a:xfrm>
-              <a:off x="2088418" y="3719390"/>
-              <a:ext cx="1675813" cy="1050177"/>
-            </a:xfrm>
-            <a:prstGeom prst="rect">
-              <a:avLst/>
-            </a:prstGeom>
-            <a:noFill/>
-            <a:extLst>
-              <a:ext uri="{909E8E84-426E-40DD-AFC4-6F175D3DCCD1}">
-                <a14:hiddenFill xmlns:a14="http://schemas.microsoft.com/office/drawing/2010/main">
-                  <a:solidFill>
-                    <a:srgbClr val="FFFFFF"/>
-                  </a:solidFill>
-                </a14:hiddenFill>
-              </a:ext>
-            </a:extLst>
-          </p:spPr>
-        </p:pic>
-        <p:pic>
-          <p:nvPicPr>
-            <p:cNvPr id="10" name="Picture 2" descr="http://www.clker.com/cliparts/4/3/a/5/1195424143626751174switch_jakub_angelis_01.svg.med.png"/>
-            <p:cNvPicPr>
-              <a:picLocks noChangeAspect="1" noChangeArrowheads="1"/>
-            </p:cNvPicPr>
-            <p:nvPr/>
-          </p:nvPicPr>
-          <p:blipFill>
-            <a:blip r:embed="rId2" cstate="print">
-              <a:extLst>
-                <a:ext uri="{28A0092B-C50C-407E-A947-70E740481C1C}">
-                  <a14:useLocalDpi xmlns:a14="http://schemas.microsoft.com/office/drawing/2010/main" val="0"/>
-                </a:ext>
-              </a:extLst>
-            </a:blip>
-            <a:srcRect/>
-            <a:stretch>
-              <a:fillRect/>
-            </a:stretch>
-          </p:blipFill>
-          <p:spPr bwMode="auto">
-            <a:xfrm>
-              <a:off x="4630741" y="4214981"/>
-              <a:ext cx="1675813" cy="1050177"/>
-            </a:xfrm>
-            <a:prstGeom prst="rect">
-              <a:avLst/>
-            </a:prstGeom>
-            <a:noFill/>
-            <a:extLst>
-              <a:ext uri="{909E8E84-426E-40DD-AFC4-6F175D3DCCD1}">
-                <a14:hiddenFill xmlns:a14="http://schemas.microsoft.com/office/drawing/2010/main">
-                  <a:solidFill>
-                    <a:srgbClr val="FFFFFF"/>
-                  </a:solidFill>
-                </a14:hiddenFill>
-              </a:ext>
-            </a:extLst>
-          </p:spPr>
-        </p:pic>
-        <p:pic>
-          <p:nvPicPr>
-            <p:cNvPr id="13" name="Picture 2" descr="http://www.clker.com/cliparts/4/3/a/5/1195424143626751174switch_jakub_angelis_01.svg.med.png"/>
-            <p:cNvPicPr>
-              <a:picLocks noChangeAspect="1" noChangeArrowheads="1"/>
-            </p:cNvPicPr>
-            <p:nvPr/>
-          </p:nvPicPr>
-          <p:blipFill>
-            <a:blip r:embed="rId2" cstate="print">
-              <a:extLst>
-                <a:ext uri="{28A0092B-C50C-407E-A947-70E740481C1C}">
-                  <a14:useLocalDpi xmlns:a14="http://schemas.microsoft.com/office/drawing/2010/main" val="0"/>
-                </a:ext>
-              </a:extLst>
-            </a:blip>
-            <a:srcRect/>
-            <a:stretch>
-              <a:fillRect/>
-            </a:stretch>
-          </p:blipFill>
-          <p:spPr bwMode="auto">
-            <a:xfrm>
-              <a:off x="7819652" y="3452543"/>
-              <a:ext cx="1675813" cy="1050177"/>
-            </a:xfrm>
-            <a:prstGeom prst="rect">
-              <a:avLst/>
-            </a:prstGeom>
-            <a:noFill/>
-            <a:extLst>
-              <a:ext uri="{909E8E84-426E-40DD-AFC4-6F175D3DCCD1}">
-                <a14:hiddenFill xmlns:a14="http://schemas.microsoft.com/office/drawing/2010/main">
-                  <a:solidFill>
-                    <a:srgbClr val="FFFFFF"/>
-                  </a:solidFill>
-                </a14:hiddenFill>
-              </a:ext>
-            </a:extLst>
-          </p:spPr>
-        </p:pic>
-        <p:grpSp>
-          <p:nvGrpSpPr>
-            <p:cNvPr id="48" name="Group 47"/>
-            <p:cNvGrpSpPr/>
-            <p:nvPr/>
-          </p:nvGrpSpPr>
-          <p:grpSpPr>
-            <a:xfrm>
-              <a:off x="3793995" y="3103863"/>
-              <a:ext cx="455949" cy="455949"/>
-              <a:chOff x="4456450" y="-807966"/>
-              <a:chExt cx="678426" cy="678426"/>
-            </a:xfrm>
-          </p:grpSpPr>
-          <p:sp>
-            <p:nvSpPr>
-              <p:cNvPr id="49" name="Oval 48"/>
-              <p:cNvSpPr/>
-              <p:nvPr/>
-            </p:nvSpPr>
-            <p:spPr>
-              <a:xfrm>
-                <a:off x="4456450" y="-807966"/>
-                <a:ext cx="678426" cy="678426"/>
-              </a:xfrm>
-              <a:prstGeom prst="ellipse">
-                <a:avLst/>
-              </a:prstGeom>
-              <a:solidFill>
-                <a:schemeClr val="bg1"/>
-              </a:solidFill>
-              <a:ln w="25400">
-                <a:solidFill>
-                  <a:schemeClr val="tx1"/>
-                </a:solidFill>
-              </a:ln>
-            </p:spPr>
-            <p:style>
-              <a:lnRef idx="2">
-                <a:schemeClr val="accent1">
-                  <a:shade val="50000"/>
-                </a:schemeClr>
-              </a:lnRef>
-              <a:fillRef idx="1">
-                <a:schemeClr val="accent1"/>
-              </a:fillRef>
-              <a:effectRef idx="0">
-                <a:schemeClr val="accent1"/>
-              </a:effectRef>
-              <a:fontRef idx="minor">
-                <a:schemeClr val="lt1"/>
-              </a:fontRef>
-            </p:style>
-            <p:txBody>
-              <a:bodyPr rtlCol="0" anchor="ctr"/>
-              <a:lstStyle/>
-              <a:p>
-                <a:pPr algn="ctr"/>
-                <a:endParaRPr lang="en-US" sz="1200"/>
-              </a:p>
-            </p:txBody>
-          </p:sp>
-          <p:sp>
-            <p:nvSpPr>
-              <p:cNvPr id="50" name="Freeform 49"/>
-              <p:cNvSpPr/>
-              <p:nvPr/>
-            </p:nvSpPr>
-            <p:spPr>
-              <a:xfrm rot="21050746">
-                <a:off x="4483242" y="-575274"/>
-                <a:ext cx="651633" cy="263842"/>
-              </a:xfrm>
-              <a:custGeom>
-                <a:avLst/>
-                <a:gdLst>
-                  <a:gd name="connsiteX0" fmla="*/ 0 w 929640"/>
-                  <a:gd name="connsiteY0" fmla="*/ 95277 h 211726"/>
-                  <a:gd name="connsiteX1" fmla="*/ 289560 w 929640"/>
-                  <a:gd name="connsiteY1" fmla="*/ 3837 h 211726"/>
-                  <a:gd name="connsiteX2" fmla="*/ 647700 w 929640"/>
-                  <a:gd name="connsiteY2" fmla="*/ 209577 h 211726"/>
-                  <a:gd name="connsiteX3" fmla="*/ 929640 w 929640"/>
-                  <a:gd name="connsiteY3" fmla="*/ 110517 h 211726"/>
-                </a:gdLst>
-                <a:ahLst/>
-                <a:cxnLst>
-                  <a:cxn ang="0">
-                    <a:pos x="connsiteX0" y="connsiteY0"/>
-                  </a:cxn>
-                  <a:cxn ang="0">
-                    <a:pos x="connsiteX1" y="connsiteY1"/>
-                  </a:cxn>
-                  <a:cxn ang="0">
-                    <a:pos x="connsiteX2" y="connsiteY2"/>
-                  </a:cxn>
-                  <a:cxn ang="0">
-                    <a:pos x="connsiteX3" y="connsiteY3"/>
-                  </a:cxn>
-                </a:cxnLst>
-                <a:rect l="l" t="t" r="r" b="b"/>
-                <a:pathLst>
-                  <a:path w="929640" h="211726">
-                    <a:moveTo>
-                      <a:pt x="0" y="95277"/>
-                    </a:moveTo>
-                    <a:cubicBezTo>
-                      <a:pt x="90805" y="40032"/>
-                      <a:pt x="181610" y="-15213"/>
-                      <a:pt x="289560" y="3837"/>
-                    </a:cubicBezTo>
-                    <a:cubicBezTo>
-                      <a:pt x="397510" y="22887"/>
-                      <a:pt x="541020" y="191797"/>
-                      <a:pt x="647700" y="209577"/>
-                    </a:cubicBezTo>
-                    <a:cubicBezTo>
-                      <a:pt x="754380" y="227357"/>
-                      <a:pt x="891540" y="129567"/>
-                      <a:pt x="929640" y="110517"/>
-                    </a:cubicBezTo>
-                  </a:path>
-                </a:pathLst>
-              </a:custGeom>
-              <a:noFill/>
-              <a:ln w="25400">
-                <a:solidFill>
-                  <a:schemeClr val="tx1"/>
-                </a:solidFill>
-              </a:ln>
-            </p:spPr>
-            <p:style>
-              <a:lnRef idx="2">
-                <a:schemeClr val="accent1">
-                  <a:shade val="50000"/>
-                </a:schemeClr>
-              </a:lnRef>
-              <a:fillRef idx="1">
-                <a:schemeClr val="accent1"/>
-              </a:fillRef>
-              <a:effectRef idx="0">
-                <a:schemeClr val="accent1"/>
-              </a:effectRef>
-              <a:fontRef idx="minor">
-                <a:schemeClr val="lt1"/>
-              </a:fontRef>
-            </p:style>
-            <p:txBody>
-              <a:bodyPr rtlCol="0" anchor="ctr"/>
-              <a:lstStyle/>
-              <a:p>
-                <a:pPr algn="ctr"/>
-                <a:endParaRPr lang="en-US" sz="1200"/>
-              </a:p>
-            </p:txBody>
-          </p:sp>
-        </p:grpSp>
-        <p:grpSp>
-          <p:nvGrpSpPr>
-            <p:cNvPr id="51" name="Group 50"/>
-            <p:cNvGrpSpPr/>
-            <p:nvPr/>
-          </p:nvGrpSpPr>
-          <p:grpSpPr>
-            <a:xfrm>
-              <a:off x="2465459" y="2859127"/>
-              <a:ext cx="455949" cy="455949"/>
-              <a:chOff x="4456450" y="-807966"/>
-              <a:chExt cx="678426" cy="678426"/>
-            </a:xfrm>
-          </p:grpSpPr>
-          <p:sp>
-            <p:nvSpPr>
-              <p:cNvPr id="52" name="Oval 51"/>
-              <p:cNvSpPr/>
-              <p:nvPr/>
-            </p:nvSpPr>
-            <p:spPr>
-              <a:xfrm>
-                <a:off x="4456450" y="-807966"/>
-                <a:ext cx="678426" cy="678426"/>
-              </a:xfrm>
-              <a:prstGeom prst="ellipse">
-                <a:avLst/>
-              </a:prstGeom>
-              <a:solidFill>
-                <a:schemeClr val="bg1"/>
-              </a:solidFill>
-              <a:ln w="25400">
-                <a:solidFill>
-                  <a:schemeClr val="tx1"/>
-                </a:solidFill>
-              </a:ln>
-            </p:spPr>
-            <p:style>
-              <a:lnRef idx="2">
-                <a:schemeClr val="accent1">
-                  <a:shade val="50000"/>
-                </a:schemeClr>
-              </a:lnRef>
-              <a:fillRef idx="1">
-                <a:schemeClr val="accent1"/>
-              </a:fillRef>
-              <a:effectRef idx="0">
-                <a:schemeClr val="accent1"/>
-              </a:effectRef>
-              <a:fontRef idx="minor">
-                <a:schemeClr val="lt1"/>
-              </a:fontRef>
-            </p:style>
-            <p:txBody>
-              <a:bodyPr rtlCol="0" anchor="ctr"/>
-              <a:lstStyle/>
-              <a:p>
-                <a:pPr algn="ctr"/>
-                <a:endParaRPr lang="en-US" sz="1200"/>
-              </a:p>
-            </p:txBody>
-          </p:sp>
-          <p:sp>
-            <p:nvSpPr>
-              <p:cNvPr id="53" name="Freeform 52"/>
-              <p:cNvSpPr/>
-              <p:nvPr/>
-            </p:nvSpPr>
-            <p:spPr>
-              <a:xfrm rot="21050746">
-                <a:off x="4483242" y="-575274"/>
-                <a:ext cx="651633" cy="263842"/>
-              </a:xfrm>
-              <a:custGeom>
-                <a:avLst/>
-                <a:gdLst>
-                  <a:gd name="connsiteX0" fmla="*/ 0 w 929640"/>
-                  <a:gd name="connsiteY0" fmla="*/ 95277 h 211726"/>
-                  <a:gd name="connsiteX1" fmla="*/ 289560 w 929640"/>
-                  <a:gd name="connsiteY1" fmla="*/ 3837 h 211726"/>
-                  <a:gd name="connsiteX2" fmla="*/ 647700 w 929640"/>
-                  <a:gd name="connsiteY2" fmla="*/ 209577 h 211726"/>
-                  <a:gd name="connsiteX3" fmla="*/ 929640 w 929640"/>
-                  <a:gd name="connsiteY3" fmla="*/ 110517 h 211726"/>
-                </a:gdLst>
-                <a:ahLst/>
-                <a:cxnLst>
-                  <a:cxn ang="0">
-                    <a:pos x="connsiteX0" y="connsiteY0"/>
-                  </a:cxn>
-                  <a:cxn ang="0">
-                    <a:pos x="connsiteX1" y="connsiteY1"/>
-                  </a:cxn>
-                  <a:cxn ang="0">
-                    <a:pos x="connsiteX2" y="connsiteY2"/>
-                  </a:cxn>
-                  <a:cxn ang="0">
-                    <a:pos x="connsiteX3" y="connsiteY3"/>
-                  </a:cxn>
-                </a:cxnLst>
-                <a:rect l="l" t="t" r="r" b="b"/>
-                <a:pathLst>
-                  <a:path w="929640" h="211726">
-                    <a:moveTo>
-                      <a:pt x="0" y="95277"/>
-                    </a:moveTo>
-                    <a:cubicBezTo>
-                      <a:pt x="90805" y="40032"/>
-                      <a:pt x="181610" y="-15213"/>
-                      <a:pt x="289560" y="3837"/>
-                    </a:cubicBezTo>
-                    <a:cubicBezTo>
-                      <a:pt x="397510" y="22887"/>
-                      <a:pt x="541020" y="191797"/>
-                      <a:pt x="647700" y="209577"/>
-                    </a:cubicBezTo>
-                    <a:cubicBezTo>
-                      <a:pt x="754380" y="227357"/>
-                      <a:pt x="891540" y="129567"/>
-                      <a:pt x="929640" y="110517"/>
-                    </a:cubicBezTo>
-                  </a:path>
-                </a:pathLst>
-              </a:custGeom>
-              <a:noFill/>
-              <a:ln w="25400">
-                <a:solidFill>
-                  <a:schemeClr val="tx1"/>
-                </a:solidFill>
-              </a:ln>
-            </p:spPr>
-            <p:style>
-              <a:lnRef idx="2">
-                <a:schemeClr val="accent1">
-                  <a:shade val="50000"/>
-                </a:schemeClr>
-              </a:lnRef>
-              <a:fillRef idx="1">
-                <a:schemeClr val="accent1"/>
-              </a:fillRef>
-              <a:effectRef idx="0">
-                <a:schemeClr val="accent1"/>
-              </a:effectRef>
-              <a:fontRef idx="minor">
-                <a:schemeClr val="lt1"/>
-              </a:fontRef>
-            </p:style>
-            <p:txBody>
-              <a:bodyPr rtlCol="0" anchor="ctr"/>
-              <a:lstStyle/>
-              <a:p>
-                <a:pPr algn="ctr"/>
-                <a:endParaRPr lang="en-US" sz="1200"/>
-              </a:p>
-            </p:txBody>
-          </p:sp>
-        </p:grpSp>
-        <p:grpSp>
-          <p:nvGrpSpPr>
-            <p:cNvPr id="54" name="Group 53"/>
-            <p:cNvGrpSpPr/>
-            <p:nvPr/>
-          </p:nvGrpSpPr>
-          <p:grpSpPr>
-            <a:xfrm>
-              <a:off x="3793995" y="4258239"/>
-              <a:ext cx="455949" cy="455949"/>
-              <a:chOff x="4456450" y="-1448314"/>
-              <a:chExt cx="678426" cy="678426"/>
-            </a:xfrm>
-          </p:grpSpPr>
-          <p:sp>
-            <p:nvSpPr>
-              <p:cNvPr id="55" name="Oval 54"/>
-              <p:cNvSpPr/>
-              <p:nvPr/>
-            </p:nvSpPr>
-            <p:spPr>
-              <a:xfrm>
-                <a:off x="4456450" y="-1448314"/>
-                <a:ext cx="678426" cy="678426"/>
-              </a:xfrm>
-              <a:prstGeom prst="ellipse">
-                <a:avLst/>
-              </a:prstGeom>
-              <a:solidFill>
-                <a:schemeClr val="bg1"/>
-              </a:solidFill>
-              <a:ln w="25400">
-                <a:solidFill>
-                  <a:schemeClr val="tx1"/>
-                </a:solidFill>
-              </a:ln>
-            </p:spPr>
-            <p:style>
-              <a:lnRef idx="2">
-                <a:schemeClr val="accent1">
-                  <a:shade val="50000"/>
-                </a:schemeClr>
-              </a:lnRef>
-              <a:fillRef idx="1">
-                <a:schemeClr val="accent1"/>
-              </a:fillRef>
-              <a:effectRef idx="0">
-                <a:schemeClr val="accent1"/>
-              </a:effectRef>
-              <a:fontRef idx="minor">
-                <a:schemeClr val="lt1"/>
-              </a:fontRef>
-            </p:style>
-            <p:txBody>
-              <a:bodyPr rtlCol="0" anchor="ctr"/>
-              <a:lstStyle/>
-              <a:p>
-                <a:pPr algn="ctr"/>
-                <a:endParaRPr lang="en-US" sz="1200"/>
-              </a:p>
-            </p:txBody>
-          </p:sp>
-          <p:sp>
-            <p:nvSpPr>
-              <p:cNvPr id="56" name="Freeform 55"/>
-              <p:cNvSpPr/>
-              <p:nvPr/>
-            </p:nvSpPr>
-            <p:spPr>
-              <a:xfrm rot="21050746">
-                <a:off x="4483242" y="-1215622"/>
-                <a:ext cx="651633" cy="263842"/>
-              </a:xfrm>
-              <a:custGeom>
-                <a:avLst/>
-                <a:gdLst>
-                  <a:gd name="connsiteX0" fmla="*/ 0 w 929640"/>
-                  <a:gd name="connsiteY0" fmla="*/ 95277 h 211726"/>
-                  <a:gd name="connsiteX1" fmla="*/ 289560 w 929640"/>
-                  <a:gd name="connsiteY1" fmla="*/ 3837 h 211726"/>
-                  <a:gd name="connsiteX2" fmla="*/ 647700 w 929640"/>
-                  <a:gd name="connsiteY2" fmla="*/ 209577 h 211726"/>
-                  <a:gd name="connsiteX3" fmla="*/ 929640 w 929640"/>
-                  <a:gd name="connsiteY3" fmla="*/ 110517 h 211726"/>
-                </a:gdLst>
-                <a:ahLst/>
-                <a:cxnLst>
-                  <a:cxn ang="0">
-                    <a:pos x="connsiteX0" y="connsiteY0"/>
-                  </a:cxn>
-                  <a:cxn ang="0">
-                    <a:pos x="connsiteX1" y="connsiteY1"/>
-                  </a:cxn>
-                  <a:cxn ang="0">
-                    <a:pos x="connsiteX2" y="connsiteY2"/>
-                  </a:cxn>
-                  <a:cxn ang="0">
-                    <a:pos x="connsiteX3" y="connsiteY3"/>
-                  </a:cxn>
-                </a:cxnLst>
-                <a:rect l="l" t="t" r="r" b="b"/>
-                <a:pathLst>
-                  <a:path w="929640" h="211726">
-                    <a:moveTo>
-                      <a:pt x="0" y="95277"/>
-                    </a:moveTo>
-                    <a:cubicBezTo>
-                      <a:pt x="90805" y="40032"/>
-                      <a:pt x="181610" y="-15213"/>
-                      <a:pt x="289560" y="3837"/>
-                    </a:cubicBezTo>
-                    <a:cubicBezTo>
-                      <a:pt x="397510" y="22887"/>
-                      <a:pt x="541020" y="191797"/>
-                      <a:pt x="647700" y="209577"/>
-                    </a:cubicBezTo>
-                    <a:cubicBezTo>
-                      <a:pt x="754380" y="227357"/>
-                      <a:pt x="891540" y="129567"/>
-                      <a:pt x="929640" y="110517"/>
-                    </a:cubicBezTo>
-                  </a:path>
-                </a:pathLst>
-              </a:custGeom>
-              <a:noFill/>
-              <a:ln w="25400">
-                <a:solidFill>
-                  <a:schemeClr val="tx1"/>
-                </a:solidFill>
-              </a:ln>
-            </p:spPr>
-            <p:style>
-              <a:lnRef idx="2">
-                <a:schemeClr val="accent1">
-                  <a:shade val="50000"/>
-                </a:schemeClr>
-              </a:lnRef>
-              <a:fillRef idx="1">
-                <a:schemeClr val="accent1"/>
-              </a:fillRef>
-              <a:effectRef idx="0">
-                <a:schemeClr val="accent1"/>
-              </a:effectRef>
-              <a:fontRef idx="minor">
-                <a:schemeClr val="lt1"/>
-              </a:fontRef>
-            </p:style>
-            <p:txBody>
-              <a:bodyPr rtlCol="0" anchor="ctr"/>
-              <a:lstStyle/>
-              <a:p>
-                <a:pPr algn="ctr"/>
-                <a:endParaRPr lang="en-US" sz="1200"/>
-              </a:p>
-            </p:txBody>
-          </p:sp>
-        </p:grpSp>
-        <p:sp>
-          <p:nvSpPr>
-            <p:cNvPr id="61" name="Rectangle 60"/>
-            <p:cNvSpPr/>
-            <p:nvPr/>
-          </p:nvSpPr>
-          <p:spPr>
-            <a:xfrm>
-              <a:off x="7748466" y="5353340"/>
-              <a:ext cx="2311166" cy="539633"/>
-            </a:xfrm>
-            <a:prstGeom prst="rect">
-              <a:avLst/>
-            </a:prstGeom>
-          </p:spPr>
-          <p:txBody>
-            <a:bodyPr wrap="none">
-              <a:spAutoFit/>
-            </a:bodyPr>
-            <a:lstStyle/>
-            <a:p>
-              <a:pPr algn="ctr"/>
-              <a:r>
-                <a:rPr lang="en-US" sz="2000" dirty="0"/>
-                <a:t>= Interposition</a:t>
-              </a:r>
-              <a:endParaRPr lang="en-US" sz="2000" dirty="0"/>
-            </a:p>
-          </p:txBody>
-        </p:sp>
-      </p:grpSp>
-      <p:sp>
-        <p:nvSpPr>
-          <p:cNvPr id="47" name="Oval 46"/>
-          <p:cNvSpPr/>
-          <p:nvPr/>
-        </p:nvSpPr>
-        <p:spPr>
-          <a:xfrm>
-            <a:off x="5749536" y="5950504"/>
-            <a:ext cx="338063" cy="338063"/>
-          </a:xfrm>
-          <a:prstGeom prst="ellipse">
-            <a:avLst/>
-          </a:prstGeom>
-          <a:solidFill>
-            <a:schemeClr val="bg1"/>
-          </a:solidFill>
-          <a:ln w="25400">
-            <a:solidFill>
-              <a:schemeClr val="tx1"/>
-            </a:solidFill>
-          </a:ln>
-        </p:spPr>
-        <p:style>
-          <a:lnRef idx="2">
-            <a:schemeClr val="accent1">
-              <a:shade val="50000"/>
-            </a:schemeClr>
-          </a:lnRef>
-          <a:fillRef idx="1">
-            <a:schemeClr val="accent1"/>
-          </a:fillRef>
-          <a:effectRef idx="0">
-            <a:schemeClr val="accent1"/>
-          </a:effectRef>
-          <a:fontRef idx="minor">
-            <a:schemeClr val="lt1"/>
-          </a:fontRef>
-        </p:style>
-        <p:txBody>
-          <a:bodyPr rtlCol="0" anchor="ctr"/>
-          <a:lstStyle/>
-          <a:p>
-            <a:pPr algn="ctr"/>
-            <a:endParaRPr lang="en-US" sz="1200"/>
-          </a:p>
-        </p:txBody>
-      </p:sp>
-      <p:sp>
-        <p:nvSpPr>
-          <p:cNvPr id="62" name="Freeform 61"/>
-          <p:cNvSpPr/>
-          <p:nvPr/>
-        </p:nvSpPr>
-        <p:spPr>
-          <a:xfrm rot="21050746">
-            <a:off x="5762887" y="6066456"/>
-            <a:ext cx="324712" cy="131474"/>
-          </a:xfrm>
-          <a:custGeom>
-            <a:avLst/>
-            <a:gdLst>
-              <a:gd name="connsiteX0" fmla="*/ 0 w 929640"/>
-              <a:gd name="connsiteY0" fmla="*/ 95277 h 211726"/>
-              <a:gd name="connsiteX1" fmla="*/ 289560 w 929640"/>
-              <a:gd name="connsiteY1" fmla="*/ 3837 h 211726"/>
-              <a:gd name="connsiteX2" fmla="*/ 647700 w 929640"/>
-              <a:gd name="connsiteY2" fmla="*/ 209577 h 211726"/>
-              <a:gd name="connsiteX3" fmla="*/ 929640 w 929640"/>
-              <a:gd name="connsiteY3" fmla="*/ 110517 h 211726"/>
-            </a:gdLst>
-            <a:ahLst/>
-            <a:cxnLst>
-              <a:cxn ang="0">
-                <a:pos x="connsiteX0" y="connsiteY0"/>
-              </a:cxn>
-              <a:cxn ang="0">
-                <a:pos x="connsiteX1" y="connsiteY1"/>
-              </a:cxn>
-              <a:cxn ang="0">
-                <a:pos x="connsiteX2" y="connsiteY2"/>
-              </a:cxn>
-              <a:cxn ang="0">
-                <a:pos x="connsiteX3" y="connsiteY3"/>
-              </a:cxn>
-            </a:cxnLst>
-            <a:rect l="l" t="t" r="r" b="b"/>
-            <a:pathLst>
-              <a:path w="929640" h="211726">
-                <a:moveTo>
-                  <a:pt x="0" y="95277"/>
-                </a:moveTo>
-                <a:cubicBezTo>
-                  <a:pt x="90805" y="40032"/>
-                  <a:pt x="181610" y="-15213"/>
-                  <a:pt x="289560" y="3837"/>
-                </a:cubicBezTo>
-                <a:cubicBezTo>
-                  <a:pt x="397510" y="22887"/>
-                  <a:pt x="541020" y="191797"/>
-                  <a:pt x="647700" y="209577"/>
-                </a:cubicBezTo>
-                <a:cubicBezTo>
-                  <a:pt x="754380" y="227357"/>
-                  <a:pt x="891540" y="129567"/>
-                  <a:pt x="929640" y="110517"/>
-                </a:cubicBezTo>
-              </a:path>
-            </a:pathLst>
-          </a:custGeom>
-          <a:noFill/>
-          <a:ln w="25400">
-            <a:solidFill>
-              <a:schemeClr val="tx1"/>
-            </a:solidFill>
-          </a:ln>
-        </p:spPr>
-        <p:style>
-          <a:lnRef idx="2">
-            <a:schemeClr val="accent1">
-              <a:shade val="50000"/>
-            </a:schemeClr>
-          </a:lnRef>
-          <a:fillRef idx="1">
-            <a:schemeClr val="accent1"/>
-          </a:fillRef>
-          <a:effectRef idx="0">
-            <a:schemeClr val="accent1"/>
-          </a:effectRef>
-          <a:fontRef idx="minor">
-            <a:schemeClr val="lt1"/>
-          </a:fontRef>
-        </p:style>
-        <p:txBody>
-          <a:bodyPr rtlCol="0" anchor="ctr"/>
-          <a:lstStyle/>
-          <a:p>
-            <a:pPr algn="ctr"/>
-            <a:endParaRPr lang="en-US" sz="1200"/>
-          </a:p>
-        </p:txBody>
-      </p:sp>
-    </p:spTree>
-    <p:extLst>
-      <p:ext uri="{BB962C8B-B14F-4D97-AF65-F5344CB8AC3E}">
-        <p14:creationId xmlns:p14="http://schemas.microsoft.com/office/powerpoint/2010/main" val="1633448118"/>
-      </p:ext>
-    </p:extLst>
-  </p:cSld>
-  <p:clrMapOvr>
-    <a:masterClrMapping/>
-  </p:clrMapOvr>
-  <p:timing>
-    <p:tnLst>
-      <p:par>
-        <p:cTn id="1" dur="indefinite" restart="never" nodeType="tmRoot"/>
+        <p:cTn xmlns:p14="http://schemas.microsoft.com/office/powerpoint/2010/main" id="1" dur="indefinite" restart="never" nodeType="tmRoot"/>
       </p:par>
     </p:tnLst>
   </p:timing>
@@ -6598,7 +4470,7 @@
     </a:clrScheme>
     <a:fontScheme name="Office">
       <a:majorFont>
-        <a:latin typeface="Calibri Light" panose="020F0302020204030204"/>
+        <a:latin typeface="Calibri Light"/>
         <a:ea typeface=""/>
         <a:cs typeface=""/>
         <a:font script="Jpan" typeface="ＭＳ Ｐゴシック"/>
@@ -6633,7 +4505,7 @@
         <a:font script="Geor" typeface="Sylfaen"/>
       </a:majorFont>
       <a:minorFont>
-        <a:latin typeface="Calibri" panose="020F0502020204030204"/>
+        <a:latin typeface="Calibri"/>
         <a:ea typeface=""/>
         <a:cs typeface=""/>
         <a:font script="Jpan" typeface="ＭＳ Ｐゴシック"/>
@@ -6810,7 +4682,7 @@
   <a:extraClrSchemeLst/>
   <a:extLst>
     <a:ext uri="{05A4C25C-085E-4340-85A3-A5531E510DB2}">
-      <thm15:themeFamily xmlns:thm15="http://schemas.microsoft.com/office/thememl/2012/main" name="Office Theme" id="{62F939B6-93AF-4DB8-9C6B-D6C7DFDC589F}" vid="{4A3C46E8-61CC-4603-A589-7422A47A8E4A}"/>
+      <thm15:themeFamily xmlns:thm15="http://schemas.microsoft.com/office/thememl/2012/main" xmlns="" name="Office Theme" id="{62F939B6-93AF-4DB8-9C6B-D6C7DFDC589F}" vid="{4A3C46E8-61CC-4603-A589-7422A47A8E4A}"/>
     </a:ext>
   </a:extLst>
 </a:theme>

</xml_diff>